<commit_message>
Finishing lecture 16 changes, lecture 17
</commit_message>
<xml_diff>
--- a/Lectures/16_Queues.pptx
+++ b/Lectures/16_Queues.pptx
@@ -274,7 +274,7 @@
           <a:p>
             <a:fld id="{6037D273-11DC-4701-9EEE-A9F2807708B9}" type="datetimeFigureOut">
               <a:rPr lang="en-US" smtClean="0"/>
-              <a:t>4/6/2025</a:t>
+              <a:t>4/12/2025</a:t>
             </a:fld>
             <a:endParaRPr lang="en-US"/>
           </a:p>
@@ -472,7 +472,7 @@
           <a:p>
             <a:fld id="{6037D273-11DC-4701-9EEE-A9F2807708B9}" type="datetimeFigureOut">
               <a:rPr lang="en-US" smtClean="0"/>
-              <a:t>4/6/2025</a:t>
+              <a:t>4/12/2025</a:t>
             </a:fld>
             <a:endParaRPr lang="en-US"/>
           </a:p>
@@ -680,7 +680,7 @@
           <a:p>
             <a:fld id="{6037D273-11DC-4701-9EEE-A9F2807708B9}" type="datetimeFigureOut">
               <a:rPr lang="en-US" smtClean="0"/>
-              <a:t>4/6/2025</a:t>
+              <a:t>4/12/2025</a:t>
             </a:fld>
             <a:endParaRPr lang="en-US"/>
           </a:p>
@@ -878,7 +878,7 @@
           <a:p>
             <a:fld id="{6037D273-11DC-4701-9EEE-A9F2807708B9}" type="datetimeFigureOut">
               <a:rPr lang="en-US" smtClean="0"/>
-              <a:t>4/6/2025</a:t>
+              <a:t>4/12/2025</a:t>
             </a:fld>
             <a:endParaRPr lang="en-US"/>
           </a:p>
@@ -1153,7 +1153,7 @@
           <a:p>
             <a:fld id="{6037D273-11DC-4701-9EEE-A9F2807708B9}" type="datetimeFigureOut">
               <a:rPr lang="en-US" smtClean="0"/>
-              <a:t>4/6/2025</a:t>
+              <a:t>4/12/2025</a:t>
             </a:fld>
             <a:endParaRPr lang="en-US"/>
           </a:p>
@@ -1418,7 +1418,7 @@
           <a:p>
             <a:fld id="{6037D273-11DC-4701-9EEE-A9F2807708B9}" type="datetimeFigureOut">
               <a:rPr lang="en-US" smtClean="0"/>
-              <a:t>4/6/2025</a:t>
+              <a:t>4/12/2025</a:t>
             </a:fld>
             <a:endParaRPr lang="en-US"/>
           </a:p>
@@ -1830,7 +1830,7 @@
           <a:p>
             <a:fld id="{6037D273-11DC-4701-9EEE-A9F2807708B9}" type="datetimeFigureOut">
               <a:rPr lang="en-US" smtClean="0"/>
-              <a:t>4/6/2025</a:t>
+              <a:t>4/12/2025</a:t>
             </a:fld>
             <a:endParaRPr lang="en-US"/>
           </a:p>
@@ -1971,7 +1971,7 @@
           <a:p>
             <a:fld id="{6037D273-11DC-4701-9EEE-A9F2807708B9}" type="datetimeFigureOut">
               <a:rPr lang="en-US" smtClean="0"/>
-              <a:t>4/6/2025</a:t>
+              <a:t>4/12/2025</a:t>
             </a:fld>
             <a:endParaRPr lang="en-US"/>
           </a:p>
@@ -2084,7 +2084,7 @@
           <a:p>
             <a:fld id="{6037D273-11DC-4701-9EEE-A9F2807708B9}" type="datetimeFigureOut">
               <a:rPr lang="en-US" smtClean="0"/>
-              <a:t>4/6/2025</a:t>
+              <a:t>4/12/2025</a:t>
             </a:fld>
             <a:endParaRPr lang="en-US"/>
           </a:p>
@@ -2395,7 +2395,7 @@
           <a:p>
             <a:fld id="{6037D273-11DC-4701-9EEE-A9F2807708B9}" type="datetimeFigureOut">
               <a:rPr lang="en-US" smtClean="0"/>
-              <a:t>4/6/2025</a:t>
+              <a:t>4/12/2025</a:t>
             </a:fld>
             <a:endParaRPr lang="en-US"/>
           </a:p>
@@ -2683,7 +2683,7 @@
           <a:p>
             <a:fld id="{6037D273-11DC-4701-9EEE-A9F2807708B9}" type="datetimeFigureOut">
               <a:rPr lang="en-US" smtClean="0"/>
-              <a:t>4/6/2025</a:t>
+              <a:t>4/12/2025</a:t>
             </a:fld>
             <a:endParaRPr lang="en-US"/>
           </a:p>
@@ -2924,7 +2924,7 @@
           <a:p>
             <a:fld id="{6037D273-11DC-4701-9EEE-A9F2807708B9}" type="datetimeFigureOut">
               <a:rPr lang="en-US" smtClean="0"/>
-              <a:t>4/6/2025</a:t>
+              <a:t>4/12/2025</a:t>
             </a:fld>
             <a:endParaRPr lang="en-US"/>
           </a:p>
@@ -3657,7 +3657,7 @@
             <a:pPr lvl="1"/>
             <a:r>
               <a:rPr lang="en-US"/>
-              <a:t>ExtractMin/Max: Remove and return the root element O(log n)</a:t>
+              <a:t>Extract Min/Max: Remove and return the root element O(log n)</a:t>
             </a:r>
           </a:p>
           <a:p>
@@ -3671,7 +3671,7 @@
             <a:pPr lvl="1"/>
             <a:r>
               <a:rPr lang="en-US"/>
-              <a:t>Peek: View the root element without removing it</a:t>
+              <a:t>Peek: View the root element without removing it O(1)</a:t>
             </a:r>
           </a:p>
           <a:p>

</xml_diff>